<commit_message>
Updated sources to include date
</commit_message>
<xml_diff>
--- a/Dokumentation/presentation/BAT-EIT-FS24-Präs-Nicora-1507146.pptx
+++ b/Dokumentation/presentation/BAT-EIT-FS24-Präs-Nicora-1507146.pptx
@@ -9,16 +9,18 @@
     <p:sldId id="262" r:id="rId3"/>
     <p:sldId id="258" r:id="rId4"/>
     <p:sldId id="261" r:id="rId5"/>
-    <p:sldId id="260" r:id="rId6"/>
-    <p:sldId id="263" r:id="rId7"/>
-    <p:sldId id="266" r:id="rId8"/>
+    <p:sldId id="266" r:id="rId6"/>
+    <p:sldId id="260" r:id="rId7"/>
+    <p:sldId id="263" r:id="rId8"/>
     <p:sldId id="264" r:id="rId9"/>
     <p:sldId id="268" r:id="rId10"/>
     <p:sldId id="267" r:id="rId11"/>
     <p:sldId id="270" r:id="rId12"/>
-    <p:sldId id="265" r:id="rId13"/>
-    <p:sldId id="269" r:id="rId14"/>
-    <p:sldId id="259" r:id="rId15"/>
+    <p:sldId id="272" r:id="rId13"/>
+    <p:sldId id="273" r:id="rId14"/>
+    <p:sldId id="271" r:id="rId15"/>
+    <p:sldId id="269" r:id="rId16"/>
+    <p:sldId id="259" r:id="rId17"/>
   </p:sldIdLst>
   <p:sldSz cx="12192000" cy="6858000"/>
   <p:notesSz cx="6858000" cy="9144000"/>
@@ -3537,7 +3539,7 @@
           <a:p>
             <a:fld id="{999A8DD2-C443-44AD-85B3-4CE72B962C5F}" type="datetimeFigureOut">
               <a:rPr lang="en-US" smtClean="0"/>
-              <a:t>4/23/2024</a:t>
+              <a:t>6/1/2024</a:t>
             </a:fld>
             <a:endParaRPr lang="en-US"/>
           </a:p>
@@ -3745,7 +3747,7 @@
           <a:p>
             <a:fld id="{999A8DD2-C443-44AD-85B3-4CE72B962C5F}" type="datetimeFigureOut">
               <a:rPr lang="en-US" smtClean="0"/>
-              <a:t>4/23/2024</a:t>
+              <a:t>6/1/2024</a:t>
             </a:fld>
             <a:endParaRPr lang="en-US"/>
           </a:p>
@@ -3953,7 +3955,7 @@
           <a:p>
             <a:fld id="{999A8DD2-C443-44AD-85B3-4CE72B962C5F}" type="datetimeFigureOut">
               <a:rPr lang="en-US" smtClean="0"/>
-              <a:t>4/23/2024</a:t>
+              <a:t>6/1/2024</a:t>
             </a:fld>
             <a:endParaRPr lang="en-US"/>
           </a:p>
@@ -4151,7 +4153,7 @@
           <a:p>
             <a:fld id="{999A8DD2-C443-44AD-85B3-4CE72B962C5F}" type="datetimeFigureOut">
               <a:rPr lang="en-US" smtClean="0"/>
-              <a:t>4/23/2024</a:t>
+              <a:t>6/1/2024</a:t>
             </a:fld>
             <a:endParaRPr lang="en-US"/>
           </a:p>
@@ -4429,7 +4431,7 @@
           <a:p>
             <a:fld id="{999A8DD2-C443-44AD-85B3-4CE72B962C5F}" type="datetimeFigureOut">
               <a:rPr lang="en-US" smtClean="0"/>
-              <a:t>4/23/2024</a:t>
+              <a:t>6/1/2024</a:t>
             </a:fld>
             <a:endParaRPr lang="en-US"/>
           </a:p>
@@ -4701,7 +4703,7 @@
           <a:p>
             <a:fld id="{999A8DD2-C443-44AD-85B3-4CE72B962C5F}" type="datetimeFigureOut">
               <a:rPr lang="en-US" smtClean="0"/>
-              <a:t>4/23/2024</a:t>
+              <a:t>6/1/2024</a:t>
             </a:fld>
             <a:endParaRPr lang="en-US"/>
           </a:p>
@@ -5125,7 +5127,7 @@
           <a:p>
             <a:fld id="{999A8DD2-C443-44AD-85B3-4CE72B962C5F}" type="datetimeFigureOut">
               <a:rPr lang="en-US" smtClean="0"/>
-              <a:t>4/23/2024</a:t>
+              <a:t>6/1/2024</a:t>
             </a:fld>
             <a:endParaRPr lang="en-US"/>
           </a:p>
@@ -5266,7 +5268,7 @@
           <a:p>
             <a:fld id="{999A8DD2-C443-44AD-85B3-4CE72B962C5F}" type="datetimeFigureOut">
               <a:rPr lang="en-US" smtClean="0"/>
-              <a:t>4/23/2024</a:t>
+              <a:t>6/1/2024</a:t>
             </a:fld>
             <a:endParaRPr lang="en-US"/>
           </a:p>
@@ -5379,7 +5381,7 @@
           <a:p>
             <a:fld id="{999A8DD2-C443-44AD-85B3-4CE72B962C5F}" type="datetimeFigureOut">
               <a:rPr lang="en-US" smtClean="0"/>
-              <a:t>4/23/2024</a:t>
+              <a:t>6/1/2024</a:t>
             </a:fld>
             <a:endParaRPr lang="en-US"/>
           </a:p>
@@ -5698,7 +5700,7 @@
           <a:p>
             <a:fld id="{999A8DD2-C443-44AD-85B3-4CE72B962C5F}" type="datetimeFigureOut">
               <a:rPr lang="en-US" smtClean="0"/>
-              <a:t>4/23/2024</a:t>
+              <a:t>6/1/2024</a:t>
             </a:fld>
             <a:endParaRPr lang="en-US"/>
           </a:p>
@@ -5992,7 +5994,7 @@
           <a:p>
             <a:fld id="{999A8DD2-C443-44AD-85B3-4CE72B962C5F}" type="datetimeFigureOut">
               <a:rPr lang="en-US" smtClean="0"/>
-              <a:t>4/23/2024</a:t>
+              <a:t>6/1/2024</a:t>
             </a:fld>
             <a:endParaRPr lang="en-US"/>
           </a:p>
@@ -6232,7 +6234,7 @@
           <a:p>
             <a:fld id="{999A8DD2-C443-44AD-85B3-4CE72B962C5F}" type="datetimeFigureOut">
               <a:rPr lang="en-US" smtClean="0"/>
-              <a:t>4/23/2024</a:t>
+              <a:t>6/1/2024</a:t>
             </a:fld>
             <a:endParaRPr lang="en-US"/>
           </a:p>
@@ -6864,7 +6866,7 @@
                 </a:solidFill>
                 <a:latin typeface="Agency FB" panose="020B0503020202020204" pitchFamily="34" charset="0"/>
               </a:rPr>
-              <a:t>BAT FS23</a:t>
+              <a:t>BAT FS24</a:t>
             </a:r>
             <a:endParaRPr lang="de-CH" sz="3600" b="0" dirty="0">
               <a:solidFill>
@@ -6910,18 +6912,7 @@
                 </a:solidFill>
                 <a:latin typeface="Agency FB" panose="020B0503020202020204" pitchFamily="34" charset="0"/>
               </a:rPr>
-              <a:t>Entwicklung einer PCB zur</a:t>
-            </a:r>
-          </a:p>
-          <a:p>
-            <a:r>
-              <a:rPr lang="de-DE" sz="6000" b="1" dirty="0">
-                <a:solidFill>
-                  <a:srgbClr val="FFFFFF"/>
-                </a:solidFill>
-                <a:latin typeface="Agency FB" panose="020B0503020202020204" pitchFamily="34" charset="0"/>
-              </a:rPr>
-              <a:t>Analyse von Umgebungslärm*</a:t>
+              <a:t>Gerät zur Überwachung von Umgebungslärm</a:t>
             </a:r>
           </a:p>
         </p:txBody>
@@ -6980,7 +6971,7 @@
                 </a:solidFill>
                 <a:latin typeface="Agency FB" panose="020B0503020202020204" pitchFamily="34" charset="0"/>
               </a:rPr>
-              <a:t>Zwischenpräsentation – 26.04.2024</a:t>
+              <a:t>Schlusspräsentation – 19.06.2024</a:t>
             </a:r>
             <a:endParaRPr lang="de-CH" sz="3600" b="0" dirty="0">
               <a:solidFill>
@@ -8137,89 +8128,9 @@
           <a:p>
             <a:r>
               <a:rPr lang="de-DE" dirty="0"/>
-              <a:t>Ausblick</a:t>
+              <a:t>Resultate</a:t>
             </a:r>
             <a:endParaRPr lang="de-CH" dirty="0"/>
-          </a:p>
-        </p:txBody>
-      </p:sp>
-      <p:sp>
-        <p:nvSpPr>
-          <p:cNvPr id="3" name="Inhaltsplatzhalter 2">
-            <a:extLst>
-              <a:ext uri="{FF2B5EF4-FFF2-40B4-BE49-F238E27FC236}">
-                <a16:creationId xmlns:a16="http://schemas.microsoft.com/office/drawing/2014/main" id="{CA9D631A-4491-E756-63E6-4F1D9B6A8C37}"/>
-              </a:ext>
-            </a:extLst>
-          </p:cNvPr>
-          <p:cNvSpPr>
-            <a:spLocks noGrp="1"/>
-          </p:cNvSpPr>
-          <p:nvPr>
-            <p:ph idx="1"/>
-          </p:nvPr>
-        </p:nvSpPr>
-        <p:spPr/>
-        <p:txBody>
-          <a:bodyPr/>
-          <a:lstStyle/>
-          <a:p>
-            <a:r>
-              <a:rPr lang="de-DE" dirty="0"/>
-              <a:t>Fertigstellung Treiber</a:t>
-            </a:r>
-          </a:p>
-          <a:p>
-            <a:r>
-              <a:rPr lang="de-DE" dirty="0"/>
-              <a:t>Implementation Gewichtungsfilter</a:t>
-            </a:r>
-          </a:p>
-          <a:p>
-            <a:r>
-              <a:rPr lang="de-CH" dirty="0"/>
-              <a:t>Testen PCB-Rev. 1-2</a:t>
-            </a:r>
-          </a:p>
-          <a:p>
-            <a:r>
-              <a:rPr lang="de-CH" dirty="0"/>
-              <a:t>Messungen</a:t>
-            </a:r>
-          </a:p>
-          <a:p>
-            <a:pPr lvl="1"/>
-            <a:r>
-              <a:rPr lang="de-CH" dirty="0"/>
-              <a:t>Leistungsaufnahme Gesamtsystem</a:t>
-            </a:r>
-          </a:p>
-          <a:p>
-            <a:pPr lvl="1"/>
-            <a:r>
-              <a:rPr lang="de-CH" dirty="0"/>
-              <a:t>Mikrofon</a:t>
-            </a:r>
-          </a:p>
-          <a:p>
-            <a:pPr lvl="1"/>
-            <a:r>
-              <a:rPr lang="de-CH" dirty="0"/>
-              <a:t>Vergleich</a:t>
-            </a:r>
-          </a:p>
-          <a:p>
-            <a:r>
-              <a:rPr lang="de-CH" dirty="0"/>
-              <a:t>Optional:</a:t>
-            </a:r>
-          </a:p>
-          <a:p>
-            <a:pPr lvl="1"/>
-            <a:r>
-              <a:rPr lang="de-CH" dirty="0"/>
-              <a:t>Implementation BLE</a:t>
-            </a:r>
           </a:p>
         </p:txBody>
       </p:sp>
@@ -8291,6 +8202,432 @@
       </p:sp>
       <p:pic>
         <p:nvPicPr>
+          <p:cNvPr id="10" name="Inhaltsplatzhalter 9">
+            <a:extLst>
+              <a:ext uri="{FF2B5EF4-FFF2-40B4-BE49-F238E27FC236}">
+                <a16:creationId xmlns:a16="http://schemas.microsoft.com/office/drawing/2014/main" id="{65AD601D-22A8-F2F6-0A21-440044650D85}"/>
+              </a:ext>
+            </a:extLst>
+          </p:cNvPr>
+          <p:cNvPicPr>
+            <a:picLocks noGrp="1" noChangeAspect="1"/>
+          </p:cNvPicPr>
+          <p:nvPr>
+            <p:ph idx="1"/>
+          </p:nvPr>
+        </p:nvPicPr>
+        <p:blipFill>
+          <a:blip r:embed="rId4"/>
+          <a:stretch>
+            <a:fillRect/>
+          </a:stretch>
+        </p:blipFill>
+        <p:spPr>
+          <a:xfrm>
+            <a:off x="6244678" y="1624228"/>
+            <a:ext cx="5701115" cy="4889775"/>
+          </a:xfrm>
+        </p:spPr>
+      </p:pic>
+      <p:pic>
+        <p:nvPicPr>
+          <p:cNvPr id="8" name="Grafik 7">
+            <a:extLst>
+              <a:ext uri="{FF2B5EF4-FFF2-40B4-BE49-F238E27FC236}">
+                <a16:creationId xmlns:a16="http://schemas.microsoft.com/office/drawing/2014/main" id="{59251A3C-11FF-6C47-6618-37775457D8ED}"/>
+              </a:ext>
+            </a:extLst>
+          </p:cNvPr>
+          <p:cNvPicPr>
+            <a:picLocks noChangeAspect="1"/>
+          </p:cNvPicPr>
+          <p:nvPr/>
+        </p:nvPicPr>
+        <p:blipFill>
+          <a:blip r:embed="rId5"/>
+          <a:stretch>
+            <a:fillRect/>
+          </a:stretch>
+        </p:blipFill>
+        <p:spPr>
+          <a:xfrm>
+            <a:off x="612647" y="1567558"/>
+            <a:ext cx="5632031" cy="4889775"/>
+          </a:xfrm>
+          <a:prstGeom prst="rect">
+            <a:avLst/>
+          </a:prstGeom>
+        </p:spPr>
+      </p:pic>
+    </p:spTree>
+    <p:extLst>
+      <p:ext uri="{BB962C8B-B14F-4D97-AF65-F5344CB8AC3E}">
+        <p14:creationId xmlns:p14="http://schemas.microsoft.com/office/powerpoint/2010/main" val="3465270031"/>
+      </p:ext>
+    </p:extLst>
+  </p:cSld>
+  <p:clrMapOvr>
+    <a:masterClrMapping/>
+  </p:clrMapOvr>
+</p:sld>
+</file>
+
+<file path=ppt/slides/slide13.xml><?xml version="1.0" encoding="utf-8"?>
+<p:sld xmlns:a="http://schemas.openxmlformats.org/drawingml/2006/main" xmlns:r="http://schemas.openxmlformats.org/officeDocument/2006/relationships" xmlns:p="http://schemas.openxmlformats.org/presentationml/2006/main">
+  <p:cSld>
+    <p:spTree>
+      <p:nvGrpSpPr>
+        <p:cNvPr id="1" name=""/>
+        <p:cNvGrpSpPr/>
+        <p:nvPr/>
+      </p:nvGrpSpPr>
+      <p:grpSpPr>
+        <a:xfrm>
+          <a:off x="0" y="0"/>
+          <a:ext cx="0" cy="0"/>
+          <a:chOff x="0" y="0"/>
+          <a:chExt cx="0" cy="0"/>
+        </a:xfrm>
+      </p:grpSpPr>
+      <p:sp>
+        <p:nvSpPr>
+          <p:cNvPr id="2" name="Titel 1">
+            <a:extLst>
+              <a:ext uri="{FF2B5EF4-FFF2-40B4-BE49-F238E27FC236}">
+                <a16:creationId xmlns:a16="http://schemas.microsoft.com/office/drawing/2014/main" id="{EC1FE7EE-7E78-7201-9C9F-49AC28E9D93F}"/>
+              </a:ext>
+            </a:extLst>
+          </p:cNvPr>
+          <p:cNvSpPr>
+            <a:spLocks noGrp="1"/>
+          </p:cNvSpPr>
+          <p:nvPr>
+            <p:ph type="title"/>
+          </p:nvPr>
+        </p:nvSpPr>
+        <p:spPr/>
+        <p:txBody>
+          <a:bodyPr/>
+          <a:lstStyle/>
+          <a:p>
+            <a:r>
+              <a:rPr lang="de-DE" dirty="0"/>
+              <a:t>Resultate</a:t>
+            </a:r>
+            <a:endParaRPr lang="de-CH" dirty="0"/>
+          </a:p>
+        </p:txBody>
+      </p:sp>
+      <p:sp>
+        <p:nvSpPr>
+          <p:cNvPr id="4" name="Rechteck 3" descr="Auge">
+            <a:extLst>
+              <a:ext uri="{FF2B5EF4-FFF2-40B4-BE49-F238E27FC236}">
+                <a16:creationId xmlns:a16="http://schemas.microsoft.com/office/drawing/2014/main" id="{FD4CC67E-18E8-86F0-AD12-AFE24B382F8B}"/>
+              </a:ext>
+            </a:extLst>
+          </p:cNvPr>
+          <p:cNvSpPr/>
+          <p:nvPr/>
+        </p:nvSpPr>
+        <p:spPr>
+          <a:xfrm>
+            <a:off x="11382000" y="0"/>
+            <a:ext cx="810000" cy="810000"/>
+          </a:xfrm>
+          <a:prstGeom prst="rect">
+            <a:avLst/>
+          </a:prstGeom>
+          <a:blipFill>
+            <a:blip r:embed="rId2">
+              <a:extLst>
+                <a:ext uri="{28A0092B-C50C-407E-A947-70E740481C1C}">
+                  <a14:useLocalDpi xmlns:a14="http://schemas.microsoft.com/office/drawing/2010/main" val="0"/>
+                </a:ext>
+                <a:ext uri="{96DAC541-7B7A-43D3-8B79-37D633B846F1}">
+                  <asvg:svgBlip xmlns:asvg="http://schemas.microsoft.com/office/drawing/2016/SVG/main" r:embed="rId3"/>
+                </a:ext>
+              </a:extLst>
+            </a:blip>
+            <a:stretch>
+              <a:fillRect/>
+            </a:stretch>
+          </a:blipFill>
+          <a:ln>
+            <a:noFill/>
+          </a:ln>
+        </p:spPr>
+        <p:style>
+          <a:lnRef idx="2">
+            <a:scrgbClr r="0" g="0" b="0"/>
+          </a:lnRef>
+          <a:fillRef idx="1">
+            <a:scrgbClr r="0" g="0" b="0"/>
+          </a:fillRef>
+          <a:effectRef idx="0">
+            <a:schemeClr val="accent6">
+              <a:hueOff val="0"/>
+              <a:satOff val="0"/>
+              <a:lumOff val="0"/>
+              <a:alphaOff val="0"/>
+            </a:schemeClr>
+          </a:effectRef>
+          <a:fontRef idx="minor">
+            <a:schemeClr val="lt1"/>
+          </a:fontRef>
+        </p:style>
+        <p:txBody>
+          <a:bodyPr/>
+          <a:lstStyle/>
+          <a:p>
+            <a:endParaRPr lang="de-CH"/>
+          </a:p>
+        </p:txBody>
+      </p:sp>
+      <p:pic>
+        <p:nvPicPr>
+          <p:cNvPr id="9" name="Inhaltsplatzhalter 8">
+            <a:extLst>
+              <a:ext uri="{FF2B5EF4-FFF2-40B4-BE49-F238E27FC236}">
+                <a16:creationId xmlns:a16="http://schemas.microsoft.com/office/drawing/2014/main" id="{F83ACCCC-3FAF-3FE4-1E02-13F2605FA94E}"/>
+              </a:ext>
+            </a:extLst>
+          </p:cNvPr>
+          <p:cNvPicPr>
+            <a:picLocks noGrp="1" noChangeAspect="1"/>
+          </p:cNvPicPr>
+          <p:nvPr>
+            <p:ph idx="1"/>
+          </p:nvPr>
+        </p:nvPicPr>
+        <p:blipFill>
+          <a:blip r:embed="rId4"/>
+          <a:stretch>
+            <a:fillRect/>
+          </a:stretch>
+        </p:blipFill>
+        <p:spPr>
+          <a:xfrm>
+            <a:off x="6123607" y="1278193"/>
+            <a:ext cx="5510960" cy="4864135"/>
+          </a:xfrm>
+        </p:spPr>
+      </p:pic>
+      <p:pic>
+        <p:nvPicPr>
+          <p:cNvPr id="6" name="Grafik 5">
+            <a:extLst>
+              <a:ext uri="{FF2B5EF4-FFF2-40B4-BE49-F238E27FC236}">
+                <a16:creationId xmlns:a16="http://schemas.microsoft.com/office/drawing/2014/main" id="{7951C066-AA77-269D-25AD-706193E84E5C}"/>
+              </a:ext>
+            </a:extLst>
+          </p:cNvPr>
+          <p:cNvPicPr>
+            <a:picLocks noChangeAspect="1"/>
+          </p:cNvPicPr>
+          <p:nvPr/>
+        </p:nvPicPr>
+        <p:blipFill>
+          <a:blip r:embed="rId5"/>
+          <a:stretch>
+            <a:fillRect/>
+          </a:stretch>
+        </p:blipFill>
+        <p:spPr>
+          <a:xfrm>
+            <a:off x="612647" y="1278194"/>
+            <a:ext cx="5510960" cy="4847303"/>
+          </a:xfrm>
+          <a:prstGeom prst="rect">
+            <a:avLst/>
+          </a:prstGeom>
+        </p:spPr>
+      </p:pic>
+    </p:spTree>
+    <p:extLst>
+      <p:ext uri="{BB962C8B-B14F-4D97-AF65-F5344CB8AC3E}">
+        <p14:creationId xmlns:p14="http://schemas.microsoft.com/office/powerpoint/2010/main" val="4109224915"/>
+      </p:ext>
+    </p:extLst>
+  </p:cSld>
+  <p:clrMapOvr>
+    <a:masterClrMapping/>
+  </p:clrMapOvr>
+</p:sld>
+</file>
+
+<file path=ppt/slides/slide14.xml><?xml version="1.0" encoding="utf-8"?>
+<p:sld xmlns:a="http://schemas.openxmlformats.org/drawingml/2006/main" xmlns:r="http://schemas.openxmlformats.org/officeDocument/2006/relationships" xmlns:p="http://schemas.openxmlformats.org/presentationml/2006/main">
+  <p:cSld>
+    <p:spTree>
+      <p:nvGrpSpPr>
+        <p:cNvPr id="1" name=""/>
+        <p:cNvGrpSpPr/>
+        <p:nvPr/>
+      </p:nvGrpSpPr>
+      <p:grpSpPr>
+        <a:xfrm>
+          <a:off x="0" y="0"/>
+          <a:ext cx="0" cy="0"/>
+          <a:chOff x="0" y="0"/>
+          <a:chExt cx="0" cy="0"/>
+        </a:xfrm>
+      </p:grpSpPr>
+      <p:sp>
+        <p:nvSpPr>
+          <p:cNvPr id="2" name="Titel 1">
+            <a:extLst>
+              <a:ext uri="{FF2B5EF4-FFF2-40B4-BE49-F238E27FC236}">
+                <a16:creationId xmlns:a16="http://schemas.microsoft.com/office/drawing/2014/main" id="{EC1FE7EE-7E78-7201-9C9F-49AC28E9D93F}"/>
+              </a:ext>
+            </a:extLst>
+          </p:cNvPr>
+          <p:cNvSpPr>
+            <a:spLocks noGrp="1"/>
+          </p:cNvSpPr>
+          <p:nvPr>
+            <p:ph type="title"/>
+          </p:nvPr>
+        </p:nvSpPr>
+        <p:spPr/>
+        <p:txBody>
+          <a:bodyPr/>
+          <a:lstStyle/>
+          <a:p>
+            <a:r>
+              <a:rPr lang="de-DE" dirty="0"/>
+              <a:t>Ausblick</a:t>
+            </a:r>
+            <a:endParaRPr lang="de-CH" dirty="0"/>
+          </a:p>
+        </p:txBody>
+      </p:sp>
+      <p:sp>
+        <p:nvSpPr>
+          <p:cNvPr id="3" name="Inhaltsplatzhalter 2">
+            <a:extLst>
+              <a:ext uri="{FF2B5EF4-FFF2-40B4-BE49-F238E27FC236}">
+                <a16:creationId xmlns:a16="http://schemas.microsoft.com/office/drawing/2014/main" id="{CA9D631A-4491-E756-63E6-4F1D9B6A8C37}"/>
+              </a:ext>
+            </a:extLst>
+          </p:cNvPr>
+          <p:cNvSpPr>
+            <a:spLocks noGrp="1"/>
+          </p:cNvSpPr>
+          <p:nvPr>
+            <p:ph idx="1"/>
+          </p:nvPr>
+        </p:nvSpPr>
+        <p:spPr/>
+        <p:txBody>
+          <a:bodyPr/>
+          <a:lstStyle/>
+          <a:p>
+            <a:r>
+              <a:rPr lang="de-DE" dirty="0"/>
+              <a:t>Implementation BLE-Funktionalität</a:t>
+            </a:r>
+          </a:p>
+          <a:p>
+            <a:r>
+              <a:rPr lang="de-DE" dirty="0"/>
+              <a:t>Bluetooth-Zertifizierung</a:t>
+            </a:r>
+          </a:p>
+          <a:p>
+            <a:r>
+              <a:rPr lang="de-CH" dirty="0"/>
+              <a:t>Zeitgewichtung</a:t>
+            </a:r>
+          </a:p>
+          <a:p>
+            <a:r>
+              <a:rPr lang="de-CH" dirty="0"/>
+              <a:t>Rauschboden-Optimierung</a:t>
+            </a:r>
+          </a:p>
+          <a:p>
+            <a:r>
+              <a:rPr lang="de-CH" dirty="0"/>
+              <a:t>Sensitivitätsfilter</a:t>
+            </a:r>
+          </a:p>
+          <a:p>
+            <a:r>
+              <a:rPr lang="de-CH" dirty="0"/>
+              <a:t>RTC</a:t>
+            </a:r>
+          </a:p>
+        </p:txBody>
+      </p:sp>
+      <p:sp>
+        <p:nvSpPr>
+          <p:cNvPr id="4" name="Rechteck 3" descr="Auge">
+            <a:extLst>
+              <a:ext uri="{FF2B5EF4-FFF2-40B4-BE49-F238E27FC236}">
+                <a16:creationId xmlns:a16="http://schemas.microsoft.com/office/drawing/2014/main" id="{FD4CC67E-18E8-86F0-AD12-AFE24B382F8B}"/>
+              </a:ext>
+            </a:extLst>
+          </p:cNvPr>
+          <p:cNvSpPr/>
+          <p:nvPr/>
+        </p:nvSpPr>
+        <p:spPr>
+          <a:xfrm>
+            <a:off x="11382000" y="0"/>
+            <a:ext cx="810000" cy="810000"/>
+          </a:xfrm>
+          <a:prstGeom prst="rect">
+            <a:avLst/>
+          </a:prstGeom>
+          <a:blipFill>
+            <a:blip r:embed="rId2">
+              <a:extLst>
+                <a:ext uri="{28A0092B-C50C-407E-A947-70E740481C1C}">
+                  <a14:useLocalDpi xmlns:a14="http://schemas.microsoft.com/office/drawing/2010/main" val="0"/>
+                </a:ext>
+                <a:ext uri="{96DAC541-7B7A-43D3-8B79-37D633B846F1}">
+                  <asvg:svgBlip xmlns:asvg="http://schemas.microsoft.com/office/drawing/2016/SVG/main" r:embed="rId3"/>
+                </a:ext>
+              </a:extLst>
+            </a:blip>
+            <a:stretch>
+              <a:fillRect/>
+            </a:stretch>
+          </a:blipFill>
+          <a:ln>
+            <a:noFill/>
+          </a:ln>
+        </p:spPr>
+        <p:style>
+          <a:lnRef idx="2">
+            <a:scrgbClr r="0" g="0" b="0"/>
+          </a:lnRef>
+          <a:fillRef idx="1">
+            <a:scrgbClr r="0" g="0" b="0"/>
+          </a:fillRef>
+          <a:effectRef idx="0">
+            <a:schemeClr val="accent6">
+              <a:hueOff val="0"/>
+              <a:satOff val="0"/>
+              <a:lumOff val="0"/>
+              <a:alphaOff val="0"/>
+            </a:schemeClr>
+          </a:effectRef>
+          <a:fontRef idx="minor">
+            <a:schemeClr val="lt1"/>
+          </a:fontRef>
+        </p:style>
+        <p:txBody>
+          <a:bodyPr/>
+          <a:lstStyle/>
+          <a:p>
+            <a:endParaRPr lang="de-CH"/>
+          </a:p>
+        </p:txBody>
+      </p:sp>
+      <p:pic>
+        <p:nvPicPr>
           <p:cNvPr id="6" name="Grafik 5" descr="Ein Bild, das Reihe, Text, Diagramm, parallel enthält.&#10;&#10;Automatisch generierte Beschreibung">
             <a:extLst>
               <a:ext uri="{FF2B5EF4-FFF2-40B4-BE49-F238E27FC236}">
@@ -8328,7 +8665,7 @@
     </p:spTree>
     <p:extLst>
       <p:ext uri="{BB962C8B-B14F-4D97-AF65-F5344CB8AC3E}">
-        <p14:creationId xmlns:p14="http://schemas.microsoft.com/office/powerpoint/2010/main" val="2554440671"/>
+        <p14:creationId xmlns:p14="http://schemas.microsoft.com/office/powerpoint/2010/main" val="3616562728"/>
       </p:ext>
     </p:extLst>
   </p:cSld>
@@ -8338,7 +8675,7 @@
 </p:sld>
 </file>
 
-<file path=ppt/slides/slide13.xml><?xml version="1.0" encoding="utf-8"?>
+<file path=ppt/slides/slide15.xml><?xml version="1.0" encoding="utf-8"?>
 <p:sld xmlns:a="http://schemas.openxmlformats.org/drawingml/2006/main" xmlns:r="http://schemas.openxmlformats.org/officeDocument/2006/relationships" xmlns:p="http://schemas.openxmlformats.org/presentationml/2006/main">
   <p:cSld>
     <p:bg>
@@ -8605,7 +8942,7 @@
 </p:sld>
 </file>
 
-<file path=ppt/slides/slide14.xml><?xml version="1.0" encoding="utf-8"?>
+<file path=ppt/slides/slide16.xml><?xml version="1.0" encoding="utf-8"?>
 <p:sld xmlns:a="http://schemas.openxmlformats.org/drawingml/2006/main" xmlns:r="http://schemas.openxmlformats.org/officeDocument/2006/relationships" xmlns:p="http://schemas.openxmlformats.org/presentationml/2006/main">
   <p:cSld>
     <p:spTree>
@@ -9640,318 +9977,9 @@
           <a:p>
             <a:r>
               <a:rPr lang="de-DE" dirty="0"/>
-              <a:t>Vorgehen</a:t>
+              <a:t>Software</a:t>
             </a:r>
             <a:endParaRPr lang="de-CH" dirty="0"/>
-          </a:p>
-        </p:txBody>
-      </p:sp>
-      <p:sp>
-        <p:nvSpPr>
-          <p:cNvPr id="3" name="Inhaltsplatzhalter 2">
-            <a:extLst>
-              <a:ext uri="{FF2B5EF4-FFF2-40B4-BE49-F238E27FC236}">
-                <a16:creationId xmlns:a16="http://schemas.microsoft.com/office/drawing/2014/main" id="{E527425F-634A-742F-70C4-31C821FC9F78}"/>
-              </a:ext>
-            </a:extLst>
-          </p:cNvPr>
-          <p:cNvSpPr>
-            <a:spLocks noGrp="1"/>
-          </p:cNvSpPr>
-          <p:nvPr>
-            <p:ph idx="1"/>
-          </p:nvPr>
-        </p:nvSpPr>
-        <p:spPr/>
-        <p:txBody>
-          <a:bodyPr/>
-          <a:lstStyle/>
-          <a:p>
-            <a:r>
-              <a:rPr lang="de-DE" dirty="0"/>
-              <a:t>Abklärung der Bedürfnisse mit </a:t>
-            </a:r>
-            <a:r>
-              <a:rPr lang="de-DE" dirty="0" err="1"/>
-              <a:t>hEar</a:t>
-            </a:r>
-            <a:endParaRPr lang="de-DE" dirty="0"/>
-          </a:p>
-          <a:p>
-            <a:r>
-              <a:rPr lang="de-DE" dirty="0"/>
-              <a:t>Anforderungskatalog ausgearbeitet</a:t>
-            </a:r>
-          </a:p>
-          <a:p>
-            <a:r>
-              <a:rPr lang="de-DE" dirty="0"/>
-              <a:t>Risikoanalyse durchgeführt</a:t>
-            </a:r>
-          </a:p>
-          <a:p>
-            <a:r>
-              <a:rPr lang="de-DE" dirty="0"/>
-              <a:t>Zeitplanung aufgestellt</a:t>
-            </a:r>
-          </a:p>
-          <a:p>
-            <a:r>
-              <a:rPr lang="de-DE" dirty="0"/>
-              <a:t>Entwicklung Hard- und Software</a:t>
-            </a:r>
-          </a:p>
-          <a:p>
-            <a:pPr lvl="1"/>
-            <a:r>
-              <a:rPr lang="de-DE" dirty="0"/>
-              <a:t>Iterativ / Agile</a:t>
-            </a:r>
-            <a:endParaRPr lang="de-CH" dirty="0"/>
-          </a:p>
-        </p:txBody>
-      </p:sp>
-      <p:sp>
-        <p:nvSpPr>
-          <p:cNvPr id="4" name="Rechteck 3" descr="Magnifying glass">
-            <a:extLst>
-              <a:ext uri="{FF2B5EF4-FFF2-40B4-BE49-F238E27FC236}">
-                <a16:creationId xmlns:a16="http://schemas.microsoft.com/office/drawing/2014/main" id="{B9ADA368-D7DA-4CAE-D4A2-478156BD3E1F}"/>
-              </a:ext>
-            </a:extLst>
-          </p:cNvPr>
-          <p:cNvSpPr/>
-          <p:nvPr/>
-        </p:nvSpPr>
-        <p:spPr>
-          <a:xfrm>
-            <a:off x="11382000" y="0"/>
-            <a:ext cx="810000" cy="810000"/>
-          </a:xfrm>
-          <a:prstGeom prst="rect">
-            <a:avLst/>
-          </a:prstGeom>
-          <a:blipFill>
-            <a:blip r:embed="rId2">
-              <a:extLst>
-                <a:ext uri="{28A0092B-C50C-407E-A947-70E740481C1C}">
-                  <a14:useLocalDpi xmlns:a14="http://schemas.microsoft.com/office/drawing/2010/main" val="0"/>
-                </a:ext>
-                <a:ext uri="{96DAC541-7B7A-43D3-8B79-37D633B846F1}">
-                  <asvg:svgBlip xmlns:asvg="http://schemas.microsoft.com/office/drawing/2016/SVG/main" r:embed="rId3"/>
-                </a:ext>
-              </a:extLst>
-            </a:blip>
-            <a:stretch>
-              <a:fillRect/>
-            </a:stretch>
-          </a:blipFill>
-          <a:ln>
-            <a:noFill/>
-          </a:ln>
-        </p:spPr>
-        <p:style>
-          <a:lnRef idx="2">
-            <a:scrgbClr r="0" g="0" b="0"/>
-          </a:lnRef>
-          <a:fillRef idx="1">
-            <a:scrgbClr r="0" g="0" b="0"/>
-          </a:fillRef>
-          <a:effectRef idx="0">
-            <a:schemeClr val="accent4">
-              <a:hueOff val="0"/>
-              <a:satOff val="0"/>
-              <a:lumOff val="0"/>
-              <a:alphaOff val="0"/>
-            </a:schemeClr>
-          </a:effectRef>
-          <a:fontRef idx="minor">
-            <a:schemeClr val="lt1"/>
-          </a:fontRef>
-        </p:style>
-        <p:txBody>
-          <a:bodyPr/>
-          <a:lstStyle/>
-          <a:p>
-            <a:endParaRPr lang="de-CH"/>
-          </a:p>
-        </p:txBody>
-      </p:sp>
-      <p:pic>
-        <p:nvPicPr>
-          <p:cNvPr id="6" name="Grafik 5">
-            <a:extLst>
-              <a:ext uri="{FF2B5EF4-FFF2-40B4-BE49-F238E27FC236}">
-                <a16:creationId xmlns:a16="http://schemas.microsoft.com/office/drawing/2014/main" id="{C07D3D33-24EC-759E-4FFF-60E680368C35}"/>
-              </a:ext>
-            </a:extLst>
-          </p:cNvPr>
-          <p:cNvPicPr>
-            <a:picLocks noChangeAspect="1"/>
-          </p:cNvPicPr>
-          <p:nvPr/>
-        </p:nvPicPr>
-        <p:blipFill>
-          <a:blip r:embed="rId4"/>
-          <a:stretch>
-            <a:fillRect/>
-          </a:stretch>
-        </p:blipFill>
-        <p:spPr>
-          <a:xfrm>
-            <a:off x="5447360" y="1715532"/>
-            <a:ext cx="6339640" cy="4358879"/>
-          </a:xfrm>
-          <a:prstGeom prst="rect">
-            <a:avLst/>
-          </a:prstGeom>
-        </p:spPr>
-      </p:pic>
-    </p:spTree>
-    <p:extLst>
-      <p:ext uri="{BB962C8B-B14F-4D97-AF65-F5344CB8AC3E}">
-        <p14:creationId xmlns:p14="http://schemas.microsoft.com/office/powerpoint/2010/main" val="316512845"/>
-      </p:ext>
-    </p:extLst>
-  </p:cSld>
-  <p:clrMapOvr>
-    <a:masterClrMapping/>
-  </p:clrMapOvr>
-</p:sld>
-</file>
-
-<file path=ppt/slides/slide6.xml><?xml version="1.0" encoding="utf-8"?>
-<p:sld xmlns:a="http://schemas.openxmlformats.org/drawingml/2006/main" xmlns:r="http://schemas.openxmlformats.org/officeDocument/2006/relationships" xmlns:p="http://schemas.openxmlformats.org/presentationml/2006/main">
-  <p:cSld>
-    <p:spTree>
-      <p:nvGrpSpPr>
-        <p:cNvPr id="1" name=""/>
-        <p:cNvGrpSpPr/>
-        <p:nvPr/>
-      </p:nvGrpSpPr>
-      <p:grpSpPr>
-        <a:xfrm>
-          <a:off x="0" y="0"/>
-          <a:ext cx="0" cy="0"/>
-          <a:chOff x="0" y="0"/>
-          <a:chExt cx="0" cy="0"/>
-        </a:xfrm>
-      </p:grpSpPr>
-      <p:sp>
-        <p:nvSpPr>
-          <p:cNvPr id="2" name="Titel 1">
-            <a:extLst>
-              <a:ext uri="{FF2B5EF4-FFF2-40B4-BE49-F238E27FC236}">
-                <a16:creationId xmlns:a16="http://schemas.microsoft.com/office/drawing/2014/main" id="{26778864-8D5C-5BAA-CCDC-344760A4F4EA}"/>
-              </a:ext>
-            </a:extLst>
-          </p:cNvPr>
-          <p:cNvSpPr>
-            <a:spLocks noGrp="1"/>
-          </p:cNvSpPr>
-          <p:nvPr>
-            <p:ph type="title"/>
-          </p:nvPr>
-        </p:nvSpPr>
-        <p:spPr/>
-        <p:txBody>
-          <a:bodyPr/>
-          <a:lstStyle/>
-          <a:p>
-            <a:r>
-              <a:rPr lang="de-DE" dirty="0"/>
-              <a:t>Stand - Software</a:t>
-            </a:r>
-            <a:endParaRPr lang="de-CH" dirty="0"/>
-          </a:p>
-        </p:txBody>
-      </p:sp>
-      <p:sp>
-        <p:nvSpPr>
-          <p:cNvPr id="3" name="Inhaltsplatzhalter 2">
-            <a:extLst>
-              <a:ext uri="{FF2B5EF4-FFF2-40B4-BE49-F238E27FC236}">
-                <a16:creationId xmlns:a16="http://schemas.microsoft.com/office/drawing/2014/main" id="{E527425F-634A-742F-70C4-31C821FC9F78}"/>
-              </a:ext>
-            </a:extLst>
-          </p:cNvPr>
-          <p:cNvSpPr>
-            <a:spLocks noGrp="1"/>
-          </p:cNvSpPr>
-          <p:nvPr>
-            <p:ph idx="1"/>
-          </p:nvPr>
-        </p:nvSpPr>
-        <p:spPr/>
-        <p:txBody>
-          <a:bodyPr>
-            <a:normAutofit/>
-          </a:bodyPr>
-          <a:lstStyle/>
-          <a:p>
-            <a:r>
-              <a:rPr lang="de-DE" dirty="0"/>
-              <a:t>I2C-Treiber</a:t>
-            </a:r>
-          </a:p>
-          <a:p>
-            <a:r>
-              <a:rPr lang="de-DE" dirty="0"/>
-              <a:t>SPI-Treiber (SDK)</a:t>
-            </a:r>
-          </a:p>
-          <a:p>
-            <a:r>
-              <a:rPr lang="de-DE" dirty="0" err="1"/>
-              <a:t>Timer</a:t>
-            </a:r>
-            <a:r>
-              <a:rPr lang="de-DE" dirty="0"/>
-              <a:t> </a:t>
-            </a:r>
-          </a:p>
-          <a:p>
-            <a:r>
-              <a:rPr lang="de-DE" u="sng" dirty="0"/>
-              <a:t>PDM-Treiber </a:t>
-            </a:r>
-          </a:p>
-          <a:p>
-            <a:r>
-              <a:rPr lang="de-DE" u="sng" dirty="0"/>
-              <a:t>PDM-Treiber </a:t>
-            </a:r>
-          </a:p>
-          <a:p>
-            <a:r>
-              <a:rPr lang="de-DE" dirty="0"/>
-              <a:t>Filterung</a:t>
-            </a:r>
-          </a:p>
-          <a:p>
-            <a:r>
-              <a:rPr lang="de-DE" dirty="0">
-                <a:solidFill>
-                  <a:schemeClr val="bg1">
-                    <a:lumMod val="50000"/>
-                  </a:schemeClr>
-                </a:solidFill>
-              </a:rPr>
-              <a:t>RTC</a:t>
-            </a:r>
-          </a:p>
-          <a:p>
-            <a:r>
-              <a:rPr lang="de-DE" dirty="0"/>
-              <a:t>Optional:</a:t>
-            </a:r>
-          </a:p>
-          <a:p>
-            <a:pPr lvl="1"/>
-            <a:r>
-              <a:rPr lang="de-DE" dirty="0"/>
-              <a:t>BLE</a:t>
-            </a:r>
           </a:p>
         </p:txBody>
       </p:sp>
@@ -10028,26 +10056,25 @@
       </p:sp>
       <p:pic>
         <p:nvPicPr>
-          <p:cNvPr id="11" name="Grafik 10" descr="Daumen runter Silhouette">
-            <a:extLst>
-              <a:ext uri="{FF2B5EF4-FFF2-40B4-BE49-F238E27FC236}">
-                <a16:creationId xmlns:a16="http://schemas.microsoft.com/office/drawing/2014/main" id="{F359D650-C8E1-3649-A9F6-C3FFE08F2A40}"/>
+          <p:cNvPr id="8" name="Inhaltsplatzhalter 7" descr="Ein Bild, das Text, Screenshot, Schrift, Design enthält.&#10;&#10;Automatisch generierte Beschreibung">
+            <a:extLst>
+              <a:ext uri="{FF2B5EF4-FFF2-40B4-BE49-F238E27FC236}">
+                <a16:creationId xmlns:a16="http://schemas.microsoft.com/office/drawing/2014/main" id="{EC4EB47F-ABF2-7ECB-3D0D-4D382931B800}"/>
               </a:ext>
             </a:extLst>
           </p:cNvPr>
           <p:cNvPicPr>
-            <a:picLocks noChangeAspect="1"/>
+            <a:picLocks noGrp="1" noChangeAspect="1"/>
           </p:cNvPicPr>
-          <p:nvPr/>
+          <p:nvPr>
+            <p:ph idx="1"/>
+          </p:nvPr>
         </p:nvPicPr>
         <p:blipFill>
           <a:blip r:embed="rId3">
             <a:extLst>
               <a:ext uri="{28A0092B-C50C-407E-A947-70E740481C1C}">
                 <a14:useLocalDpi xmlns:a14="http://schemas.microsoft.com/office/drawing/2010/main" val="0"/>
-              </a:ext>
-              <a:ext uri="{96DAC541-7B7A-43D3-8B79-37D633B846F1}">
-                <asvg:svgBlip xmlns:asvg="http://schemas.microsoft.com/office/drawing/2016/SVG/main" r:embed="rId4"/>
               </a:ext>
             </a:extLst>
           </a:blip>
@@ -10057,36 +10084,91 @@
         </p:blipFill>
         <p:spPr>
           <a:xfrm>
-            <a:off x="3388524" y="3680251"/>
-            <a:ext cx="2160000" cy="2160000"/>
+            <a:off x="1510251" y="1338505"/>
+            <a:ext cx="9171498" cy="5194591"/>
           </a:xfrm>
-          <a:prstGeom prst="rect">
-            <a:avLst/>
-          </a:prstGeom>
         </p:spPr>
       </p:pic>
+    </p:spTree>
+    <p:extLst>
+      <p:ext uri="{BB962C8B-B14F-4D97-AF65-F5344CB8AC3E}">
+        <p14:creationId xmlns:p14="http://schemas.microsoft.com/office/powerpoint/2010/main" val="982570376"/>
+      </p:ext>
+    </p:extLst>
+  </p:cSld>
+  <p:clrMapOvr>
+    <a:masterClrMapping/>
+  </p:clrMapOvr>
+</p:sld>
+</file>
+
+<file path=ppt/slides/slide6.xml><?xml version="1.0" encoding="utf-8"?>
+<p:sld xmlns:a="http://schemas.openxmlformats.org/drawingml/2006/main" xmlns:r="http://schemas.openxmlformats.org/officeDocument/2006/relationships" xmlns:p="http://schemas.openxmlformats.org/presentationml/2006/main">
+  <p:cSld>
+    <p:spTree>
+      <p:nvGrpSpPr>
+        <p:cNvPr id="1" name=""/>
+        <p:cNvGrpSpPr/>
+        <p:nvPr/>
+      </p:nvGrpSpPr>
+      <p:grpSpPr>
+        <a:xfrm>
+          <a:off x="0" y="0"/>
+          <a:ext cx="0" cy="0"/>
+          <a:chOff x="0" y="0"/>
+          <a:chExt cx="0" cy="0"/>
+        </a:xfrm>
+      </p:grpSpPr>
+      <p:sp>
+        <p:nvSpPr>
+          <p:cNvPr id="2" name="Titel 1">
+            <a:extLst>
+              <a:ext uri="{FF2B5EF4-FFF2-40B4-BE49-F238E27FC236}">
+                <a16:creationId xmlns:a16="http://schemas.microsoft.com/office/drawing/2014/main" id="{26778864-8D5C-5BAA-CCDC-344760A4F4EA}"/>
+              </a:ext>
+            </a:extLst>
+          </p:cNvPr>
+          <p:cNvSpPr>
+            <a:spLocks noGrp="1"/>
+          </p:cNvSpPr>
+          <p:nvPr>
+            <p:ph type="title"/>
+          </p:nvPr>
+        </p:nvSpPr>
+        <p:spPr/>
+        <p:txBody>
+          <a:bodyPr/>
+          <a:lstStyle/>
+          <a:p>
+            <a:r>
+              <a:rPr lang="de-DE" dirty="0"/>
+              <a:t>Signalverarbeitung</a:t>
+            </a:r>
+            <a:endParaRPr lang="de-CH" dirty="0"/>
+          </a:p>
+        </p:txBody>
+      </p:sp>
       <p:pic>
         <p:nvPicPr>
-          <p:cNvPr id="12" name="Grafik 11" descr="Daumen hoch-Zeichen Silhouette">
-            <a:extLst>
-              <a:ext uri="{FF2B5EF4-FFF2-40B4-BE49-F238E27FC236}">
-                <a16:creationId xmlns:a16="http://schemas.microsoft.com/office/drawing/2014/main" id="{6FF2B58D-EBD6-C1D7-0CE9-D13D333DC236}"/>
+          <p:cNvPr id="7" name="Inhaltsplatzhalter 6" descr="Ein Bild, das Diagramm, Screenshot, Plan, Text enthält.&#10;&#10;Automatisch generierte Beschreibung">
+            <a:extLst>
+              <a:ext uri="{FF2B5EF4-FFF2-40B4-BE49-F238E27FC236}">
+                <a16:creationId xmlns:a16="http://schemas.microsoft.com/office/drawing/2014/main" id="{38BB0EC5-D15D-E68A-9912-5983E6542AB8}"/>
               </a:ext>
             </a:extLst>
           </p:cNvPr>
           <p:cNvPicPr>
-            <a:picLocks noChangeAspect="1"/>
+            <a:picLocks noGrp="1" noChangeAspect="1"/>
           </p:cNvPicPr>
-          <p:nvPr/>
+          <p:nvPr>
+            <p:ph idx="1"/>
+          </p:nvPr>
         </p:nvPicPr>
         <p:blipFill>
-          <a:blip r:embed="rId5">
+          <a:blip r:embed="rId2">
             <a:extLst>
               <a:ext uri="{28A0092B-C50C-407E-A947-70E740481C1C}">
                 <a14:useLocalDpi xmlns:a14="http://schemas.microsoft.com/office/drawing/2010/main" val="0"/>
-              </a:ext>
-              <a:ext uri="{96DAC541-7B7A-43D3-8B79-37D633B846F1}">
-                <asvg:svgBlip xmlns:asvg="http://schemas.microsoft.com/office/drawing/2016/SVG/main" r:embed="rId6"/>
               </a:ext>
             </a:extLst>
           </a:blip>
@@ -10096,92 +10178,81 @@
         </p:blipFill>
         <p:spPr>
           <a:xfrm>
-            <a:off x="3388524" y="1269000"/>
-            <a:ext cx="2160000" cy="2160000"/>
+            <a:off x="1372087" y="1680898"/>
+            <a:ext cx="9447825" cy="4280168"/>
+          </a:xfrm>
+        </p:spPr>
+      </p:pic>
+      <p:sp>
+        <p:nvSpPr>
+          <p:cNvPr id="4" name="Rechteck 3" descr="Magnifying glass">
+            <a:extLst>
+              <a:ext uri="{FF2B5EF4-FFF2-40B4-BE49-F238E27FC236}">
+                <a16:creationId xmlns:a16="http://schemas.microsoft.com/office/drawing/2014/main" id="{B9ADA368-D7DA-4CAE-D4A2-478156BD3E1F}"/>
+              </a:ext>
+            </a:extLst>
+          </p:cNvPr>
+          <p:cNvSpPr/>
+          <p:nvPr/>
+        </p:nvSpPr>
+        <p:spPr>
+          <a:xfrm>
+            <a:off x="11382000" y="0"/>
+            <a:ext cx="810000" cy="810000"/>
           </a:xfrm>
           <a:prstGeom prst="rect">
             <a:avLst/>
           </a:prstGeom>
-        </p:spPr>
-      </p:pic>
-      <p:cxnSp>
-        <p:nvCxnSpPr>
-          <p:cNvPr id="14" name="Gerader Verbinder 13">
-            <a:extLst>
-              <a:ext uri="{FF2B5EF4-FFF2-40B4-BE49-F238E27FC236}">
-                <a16:creationId xmlns:a16="http://schemas.microsoft.com/office/drawing/2014/main" id="{5049E9AD-145F-0AFF-1D6A-CDC18F284C29}"/>
-              </a:ext>
-            </a:extLst>
-          </p:cNvPr>
-          <p:cNvCxnSpPr>
-            <a:cxnSpLocks/>
-          </p:cNvCxnSpPr>
-          <p:nvPr/>
-        </p:nvCxnSpPr>
-        <p:spPr>
-          <a:xfrm>
-            <a:off x="612647" y="3668676"/>
-            <a:ext cx="4688558" cy="0"/>
-          </a:xfrm>
-          <a:prstGeom prst="line">
-            <a:avLst/>
-          </a:prstGeom>
+          <a:blipFill>
+            <a:blip r:embed="rId3">
+              <a:extLst>
+                <a:ext uri="{28A0092B-C50C-407E-A947-70E740481C1C}">
+                  <a14:useLocalDpi xmlns:a14="http://schemas.microsoft.com/office/drawing/2010/main" val="0"/>
+                </a:ext>
+                <a:ext uri="{96DAC541-7B7A-43D3-8B79-37D633B846F1}">
+                  <asvg:svgBlip xmlns:asvg="http://schemas.microsoft.com/office/drawing/2016/SVG/main" r:embed="rId4"/>
+                </a:ext>
+              </a:extLst>
+            </a:blip>
+            <a:stretch>
+              <a:fillRect/>
+            </a:stretch>
+          </a:blipFill>
+          <a:ln>
+            <a:noFill/>
+          </a:ln>
         </p:spPr>
         <p:style>
-          <a:lnRef idx="1">
-            <a:schemeClr val="accent1"/>
+          <a:lnRef idx="2">
+            <a:scrgbClr r="0" g="0" b="0"/>
           </a:lnRef>
-          <a:fillRef idx="0">
-            <a:schemeClr val="accent1"/>
+          <a:fillRef idx="1">
+            <a:scrgbClr r="0" g="0" b="0"/>
           </a:fillRef>
           <a:effectRef idx="0">
-            <a:schemeClr val="accent1"/>
+            <a:schemeClr val="accent4">
+              <a:hueOff val="0"/>
+              <a:satOff val="0"/>
+              <a:lumOff val="0"/>
+              <a:alphaOff val="0"/>
+            </a:schemeClr>
           </a:effectRef>
           <a:fontRef idx="minor">
-            <a:schemeClr val="tx1"/>
+            <a:schemeClr val="lt1"/>
           </a:fontRef>
         </p:style>
-      </p:cxnSp>
-      <p:pic>
-        <p:nvPicPr>
-          <p:cNvPr id="19" name="Grafik 18" descr="Ein Bild, das Grafiken, Design enthält.&#10;&#10;Automatisch generierte Beschreibung">
-            <a:extLst>
-              <a:ext uri="{FF2B5EF4-FFF2-40B4-BE49-F238E27FC236}">
-                <a16:creationId xmlns:a16="http://schemas.microsoft.com/office/drawing/2014/main" id="{F3E9F2D1-7092-CAEB-01EF-91DE86EF5DC0}"/>
-              </a:ext>
-            </a:extLst>
-          </p:cNvPr>
-          <p:cNvPicPr>
-            <a:picLocks noChangeAspect="1"/>
-          </p:cNvPicPr>
-          <p:nvPr/>
-        </p:nvPicPr>
-        <p:blipFill>
-          <a:blip r:embed="rId7">
-            <a:extLst>
-              <a:ext uri="{28A0092B-C50C-407E-A947-70E740481C1C}">
-                <a14:useLocalDpi xmlns:a14="http://schemas.microsoft.com/office/drawing/2010/main" val="0"/>
-              </a:ext>
-            </a:extLst>
-          </a:blip>
-          <a:stretch>
-            <a:fillRect/>
-          </a:stretch>
-        </p:blipFill>
-        <p:spPr>
-          <a:xfrm>
-            <a:off x="7365012" y="2422812"/>
-            <a:ext cx="3901214" cy="2012376"/>
-          </a:xfrm>
-          <a:prstGeom prst="rect">
-            <a:avLst/>
-          </a:prstGeom>
-        </p:spPr>
-      </p:pic>
+        <p:txBody>
+          <a:bodyPr/>
+          <a:lstStyle/>
+          <a:p>
+            <a:endParaRPr lang="de-CH"/>
+          </a:p>
+        </p:txBody>
+      </p:sp>
     </p:spTree>
     <p:extLst>
       <p:ext uri="{BB962C8B-B14F-4D97-AF65-F5344CB8AC3E}">
-        <p14:creationId xmlns:p14="http://schemas.microsoft.com/office/powerpoint/2010/main" val="3575849031"/>
+        <p14:creationId xmlns:p14="http://schemas.microsoft.com/office/powerpoint/2010/main" val="316512845"/>
       </p:ext>
     </p:extLst>
   </p:cSld>
@@ -10234,6 +10305,95 @@
               <a:t>Stand - Software</a:t>
             </a:r>
             <a:endParaRPr lang="de-CH" dirty="0"/>
+          </a:p>
+        </p:txBody>
+      </p:sp>
+      <p:sp>
+        <p:nvSpPr>
+          <p:cNvPr id="3" name="Inhaltsplatzhalter 2">
+            <a:extLst>
+              <a:ext uri="{FF2B5EF4-FFF2-40B4-BE49-F238E27FC236}">
+                <a16:creationId xmlns:a16="http://schemas.microsoft.com/office/drawing/2014/main" id="{E527425F-634A-742F-70C4-31C821FC9F78}"/>
+              </a:ext>
+            </a:extLst>
+          </p:cNvPr>
+          <p:cNvSpPr>
+            <a:spLocks noGrp="1"/>
+          </p:cNvSpPr>
+          <p:nvPr>
+            <p:ph idx="1"/>
+          </p:nvPr>
+        </p:nvSpPr>
+        <p:spPr/>
+        <p:txBody>
+          <a:bodyPr>
+            <a:normAutofit/>
+          </a:bodyPr>
+          <a:lstStyle/>
+          <a:p>
+            <a:r>
+              <a:rPr lang="de-DE" dirty="0"/>
+              <a:t>I2C-Treiber</a:t>
+            </a:r>
+          </a:p>
+          <a:p>
+            <a:r>
+              <a:rPr lang="de-DE" dirty="0"/>
+              <a:t>SPI-Treiber (SDK)</a:t>
+            </a:r>
+          </a:p>
+          <a:p>
+            <a:r>
+              <a:rPr lang="de-DE" dirty="0" err="1"/>
+              <a:t>Timer</a:t>
+            </a:r>
+            <a:r>
+              <a:rPr lang="de-DE" dirty="0"/>
+              <a:t> </a:t>
+            </a:r>
+          </a:p>
+          <a:p>
+            <a:r>
+              <a:rPr lang="de-DE" u="sng" dirty="0"/>
+              <a:t>PDM-Treiber </a:t>
+            </a:r>
+          </a:p>
+          <a:p>
+            <a:r>
+              <a:rPr lang="de-DE" u="sng" dirty="0"/>
+              <a:t>PDM-Treiber </a:t>
+            </a:r>
+          </a:p>
+          <a:p>
+            <a:r>
+              <a:rPr lang="de-DE" dirty="0"/>
+              <a:t>Filterung</a:t>
+            </a:r>
+          </a:p>
+          <a:p>
+            <a:r>
+              <a:rPr lang="de-DE" dirty="0">
+                <a:solidFill>
+                  <a:schemeClr val="bg1">
+                    <a:lumMod val="50000"/>
+                  </a:schemeClr>
+                </a:solidFill>
+              </a:rPr>
+              <a:t>RTC</a:t>
+            </a:r>
+          </a:p>
+          <a:p>
+            <a:r>
+              <a:rPr lang="de-DE" dirty="0"/>
+              <a:t>Optional:</a:t>
+            </a:r>
+          </a:p>
+          <a:p>
+            <a:pPr lvl="1"/>
+            <a:r>
+              <a:rPr lang="de-DE" dirty="0"/>
+              <a:t>BLE</a:t>
+            </a:r>
           </a:p>
         </p:txBody>
       </p:sp>
@@ -10310,25 +10470,26 @@
       </p:sp>
       <p:pic>
         <p:nvPicPr>
-          <p:cNvPr id="8" name="Inhaltsplatzhalter 7" descr="Ein Bild, das Text, Screenshot, Schrift, Design enthält.&#10;&#10;Automatisch generierte Beschreibung">
-            <a:extLst>
-              <a:ext uri="{FF2B5EF4-FFF2-40B4-BE49-F238E27FC236}">
-                <a16:creationId xmlns:a16="http://schemas.microsoft.com/office/drawing/2014/main" id="{EC4EB47F-ABF2-7ECB-3D0D-4D382931B800}"/>
+          <p:cNvPr id="11" name="Grafik 10" descr="Daumen runter Silhouette">
+            <a:extLst>
+              <a:ext uri="{FF2B5EF4-FFF2-40B4-BE49-F238E27FC236}">
+                <a16:creationId xmlns:a16="http://schemas.microsoft.com/office/drawing/2014/main" id="{F359D650-C8E1-3649-A9F6-C3FFE08F2A40}"/>
               </a:ext>
             </a:extLst>
           </p:cNvPr>
           <p:cNvPicPr>
-            <a:picLocks noGrp="1" noChangeAspect="1"/>
+            <a:picLocks noChangeAspect="1"/>
           </p:cNvPicPr>
-          <p:nvPr>
-            <p:ph idx="1"/>
-          </p:nvPr>
+          <p:nvPr/>
         </p:nvPicPr>
         <p:blipFill>
           <a:blip r:embed="rId3">
             <a:extLst>
               <a:ext uri="{28A0092B-C50C-407E-A947-70E740481C1C}">
                 <a14:useLocalDpi xmlns:a14="http://schemas.microsoft.com/office/drawing/2010/main" val="0"/>
+              </a:ext>
+              <a:ext uri="{96DAC541-7B7A-43D3-8B79-37D633B846F1}">
+                <asvg:svgBlip xmlns:asvg="http://schemas.microsoft.com/office/drawing/2016/SVG/main" r:embed="rId4"/>
               </a:ext>
             </a:extLst>
           </a:blip>
@@ -10338,15 +10499,131 @@
         </p:blipFill>
         <p:spPr>
           <a:xfrm>
-            <a:off x="1510251" y="1338505"/>
-            <a:ext cx="9171498" cy="5194591"/>
+            <a:off x="3388524" y="3680251"/>
+            <a:ext cx="2160000" cy="2160000"/>
           </a:xfrm>
+          <a:prstGeom prst="rect">
+            <a:avLst/>
+          </a:prstGeom>
+        </p:spPr>
+      </p:pic>
+      <p:pic>
+        <p:nvPicPr>
+          <p:cNvPr id="12" name="Grafik 11" descr="Daumen hoch-Zeichen Silhouette">
+            <a:extLst>
+              <a:ext uri="{FF2B5EF4-FFF2-40B4-BE49-F238E27FC236}">
+                <a16:creationId xmlns:a16="http://schemas.microsoft.com/office/drawing/2014/main" id="{6FF2B58D-EBD6-C1D7-0CE9-D13D333DC236}"/>
+              </a:ext>
+            </a:extLst>
+          </p:cNvPr>
+          <p:cNvPicPr>
+            <a:picLocks noChangeAspect="1"/>
+          </p:cNvPicPr>
+          <p:nvPr/>
+        </p:nvPicPr>
+        <p:blipFill>
+          <a:blip r:embed="rId5">
+            <a:extLst>
+              <a:ext uri="{28A0092B-C50C-407E-A947-70E740481C1C}">
+                <a14:useLocalDpi xmlns:a14="http://schemas.microsoft.com/office/drawing/2010/main" val="0"/>
+              </a:ext>
+              <a:ext uri="{96DAC541-7B7A-43D3-8B79-37D633B846F1}">
+                <asvg:svgBlip xmlns:asvg="http://schemas.microsoft.com/office/drawing/2016/SVG/main" r:embed="rId6"/>
+              </a:ext>
+            </a:extLst>
+          </a:blip>
+          <a:stretch>
+            <a:fillRect/>
+          </a:stretch>
+        </p:blipFill>
+        <p:spPr>
+          <a:xfrm>
+            <a:off x="3388524" y="1269000"/>
+            <a:ext cx="2160000" cy="2160000"/>
+          </a:xfrm>
+          <a:prstGeom prst="rect">
+            <a:avLst/>
+          </a:prstGeom>
+        </p:spPr>
+      </p:pic>
+      <p:cxnSp>
+        <p:nvCxnSpPr>
+          <p:cNvPr id="14" name="Gerader Verbinder 13">
+            <a:extLst>
+              <a:ext uri="{FF2B5EF4-FFF2-40B4-BE49-F238E27FC236}">
+                <a16:creationId xmlns:a16="http://schemas.microsoft.com/office/drawing/2014/main" id="{5049E9AD-145F-0AFF-1D6A-CDC18F284C29}"/>
+              </a:ext>
+            </a:extLst>
+          </p:cNvPr>
+          <p:cNvCxnSpPr>
+            <a:cxnSpLocks/>
+          </p:cNvCxnSpPr>
+          <p:nvPr/>
+        </p:nvCxnSpPr>
+        <p:spPr>
+          <a:xfrm>
+            <a:off x="612647" y="3668676"/>
+            <a:ext cx="4688558" cy="0"/>
+          </a:xfrm>
+          <a:prstGeom prst="line">
+            <a:avLst/>
+          </a:prstGeom>
+        </p:spPr>
+        <p:style>
+          <a:lnRef idx="1">
+            <a:schemeClr val="accent1"/>
+          </a:lnRef>
+          <a:fillRef idx="0">
+            <a:schemeClr val="accent1"/>
+          </a:fillRef>
+          <a:effectRef idx="0">
+            <a:schemeClr val="accent1"/>
+          </a:effectRef>
+          <a:fontRef idx="minor">
+            <a:schemeClr val="tx1"/>
+          </a:fontRef>
+        </p:style>
+      </p:cxnSp>
+      <p:pic>
+        <p:nvPicPr>
+          <p:cNvPr id="19" name="Grafik 18" descr="Ein Bild, das Grafiken, Design enthält.&#10;&#10;Automatisch generierte Beschreibung">
+            <a:extLst>
+              <a:ext uri="{FF2B5EF4-FFF2-40B4-BE49-F238E27FC236}">
+                <a16:creationId xmlns:a16="http://schemas.microsoft.com/office/drawing/2014/main" id="{F3E9F2D1-7092-CAEB-01EF-91DE86EF5DC0}"/>
+              </a:ext>
+            </a:extLst>
+          </p:cNvPr>
+          <p:cNvPicPr>
+            <a:picLocks noChangeAspect="1"/>
+          </p:cNvPicPr>
+          <p:nvPr/>
+        </p:nvPicPr>
+        <p:blipFill>
+          <a:blip r:embed="rId7">
+            <a:extLst>
+              <a:ext uri="{28A0092B-C50C-407E-A947-70E740481C1C}">
+                <a14:useLocalDpi xmlns:a14="http://schemas.microsoft.com/office/drawing/2010/main" val="0"/>
+              </a:ext>
+            </a:extLst>
+          </a:blip>
+          <a:stretch>
+            <a:fillRect/>
+          </a:stretch>
+        </p:blipFill>
+        <p:spPr>
+          <a:xfrm>
+            <a:off x="7365012" y="2422812"/>
+            <a:ext cx="3901214" cy="2012376"/>
+          </a:xfrm>
+          <a:prstGeom prst="rect">
+            <a:avLst/>
+          </a:prstGeom>
         </p:spPr>
       </p:pic>
     </p:spTree>
     <p:extLst>
       <p:ext uri="{BB962C8B-B14F-4D97-AF65-F5344CB8AC3E}">
-        <p14:creationId xmlns:p14="http://schemas.microsoft.com/office/powerpoint/2010/main" val="982570376"/>
+        <p14:creationId xmlns:p14="http://schemas.microsoft.com/office/powerpoint/2010/main" val="3575849031"/>
       </p:ext>
     </p:extLst>
   </p:cSld>

</xml_diff>